<commit_message>
Update lecture to use Gauss example.
</commit_message>
<xml_diff>
--- a/Lectures/Introduction to MPI/Introduction to MPI.pptx
+++ b/Lectures/Introduction to MPI/Introduction to MPI.pptx
@@ -212,7 +212,7 @@
           <a:p>
             <a:fld id="{DBE0ECA1-3FBF-48AE-AD2A-4439AE745E19}" type="datetimeFigureOut">
               <a:rPr lang="en-US" smtClean="0"/>
-              <a:t>1/5/2014</a:t>
+              <a:t>1/6/2014</a:t>
             </a:fld>
             <a:endParaRPr lang="en-US"/>
           </a:p>
@@ -673,7 +673,7 @@
           <a:p>
             <a:fld id="{9769DED8-28D4-45B9-A00F-7CFE9335FEA6}" type="datetime1">
               <a:rPr lang="en-US" smtClean="0"/>
-              <a:t>1/5/2014</a:t>
+              <a:t>1/6/2014</a:t>
             </a:fld>
             <a:endParaRPr lang="en-US"/>
           </a:p>
@@ -938,7 +938,7 @@
           <a:p>
             <a:fld id="{2DB3D439-1F88-44B4-B5F7-F9BCD4064257}" type="datetime1">
               <a:rPr lang="en-US" smtClean="0"/>
-              <a:t>1/5/2014</a:t>
+              <a:t>1/6/2014</a:t>
             </a:fld>
             <a:endParaRPr lang="en-US"/>
           </a:p>
@@ -1113,7 +1113,7 @@
           <a:p>
             <a:fld id="{99C5638F-6F55-4055-935C-67841BE78C36}" type="datetime1">
               <a:rPr lang="en-US" smtClean="0"/>
-              <a:t>1/5/2014</a:t>
+              <a:t>1/6/2014</a:t>
             </a:fld>
             <a:endParaRPr lang="en-US"/>
           </a:p>
@@ -1278,7 +1278,7 @@
           <a:p>
             <a:fld id="{E6987D90-0C92-4B22-A29D-FED15412CED2}" type="datetime1">
               <a:rPr lang="en-US" smtClean="0"/>
-              <a:t>1/5/2014</a:t>
+              <a:t>1/6/2014</a:t>
             </a:fld>
             <a:endParaRPr lang="en-US"/>
           </a:p>
@@ -1527,7 +1527,7 @@
           <a:p>
             <a:fld id="{DDB67BC4-9554-49E0-BCB3-D1EF965BA0B8}" type="datetime1">
               <a:rPr lang="en-US" smtClean="0"/>
-              <a:t>1/5/2014</a:t>
+              <a:t>1/6/2014</a:t>
             </a:fld>
             <a:endParaRPr lang="en-US"/>
           </a:p>
@@ -1810,7 +1810,7 @@
           <a:p>
             <a:fld id="{EC24D770-803D-4E01-921C-9C100DD8230C}" type="datetime1">
               <a:rPr lang="en-US" smtClean="0"/>
-              <a:t>1/5/2014</a:t>
+              <a:t>1/6/2014</a:t>
             </a:fld>
             <a:endParaRPr lang="en-US"/>
           </a:p>
@@ -2249,7 +2249,7 @@
           <a:p>
             <a:fld id="{356AD44B-78A4-4209-8070-7DCBE2DC4992}" type="datetime1">
               <a:rPr lang="en-US" smtClean="0"/>
-              <a:t>1/5/2014</a:t>
+              <a:t>1/6/2014</a:t>
             </a:fld>
             <a:endParaRPr lang="en-US"/>
           </a:p>
@@ -2362,7 +2362,7 @@
           <a:p>
             <a:fld id="{A993C59A-7CA2-467F-B7F1-9096881A01B8}" type="datetime1">
               <a:rPr lang="en-US" smtClean="0"/>
-              <a:t>1/5/2014</a:t>
+              <a:t>1/6/2014</a:t>
             </a:fld>
             <a:endParaRPr lang="en-US"/>
           </a:p>
@@ -2452,7 +2452,7 @@
           <a:p>
             <a:fld id="{2B6B58D0-2488-434A-8ED1-692E09B85CC5}" type="datetime1">
               <a:rPr lang="en-US" smtClean="0"/>
-              <a:t>1/5/2014</a:t>
+              <a:t>1/6/2014</a:t>
             </a:fld>
             <a:endParaRPr lang="en-US"/>
           </a:p>
@@ -2694,7 +2694,7 @@
           <a:p>
             <a:fld id="{FDB0AFC2-7D64-4F61-A7B7-9932D3305DDA}" type="datetime1">
               <a:rPr lang="en-US" smtClean="0"/>
-              <a:t>1/5/2014</a:t>
+              <a:t>1/6/2014</a:t>
             </a:fld>
             <a:endParaRPr lang="en-US"/>
           </a:p>
@@ -2988,7 +2988,7 @@
           <a:p>
             <a:fld id="{4983D17A-D7B2-4ECE-8A2C-93679B9D177B}" type="datetime1">
               <a:rPr lang="en-US" smtClean="0"/>
-              <a:t>1/5/2014</a:t>
+              <a:t>1/6/2014</a:t>
             </a:fld>
             <a:endParaRPr lang="en-US"/>
           </a:p>
@@ -3282,7 +3282,7 @@
           <a:p>
             <a:fld id="{2A5275F7-419E-4C23-8A3D-2EE5742B2EC9}" type="datetime1">
               <a:rPr lang="en-US" smtClean="0"/>
-              <a:t>1/5/2014</a:t>
+              <a:t>1/6/2014</a:t>
             </a:fld>
             <a:endParaRPr lang="en-US"/>
           </a:p>
@@ -7899,7 +7899,11 @@
           <a:p>
             <a:r>
               <a:rPr lang="en-US" dirty="0" smtClean="0"/>
-              <a:t>Matrix Multiplication</a:t>
+              <a:t>Gaus</a:t>
+            </a:r>
+            <a:r>
+              <a:rPr lang="en-US" dirty="0" smtClean="0"/>
+              <a:t>s using MPI</a:t>
             </a:r>
             <a:endParaRPr lang="en-US" dirty="0"/>
           </a:p>
@@ -7922,7 +7926,7 @@
           <a:p>
             <a:r>
               <a:rPr lang="en-US" dirty="0" smtClean="0"/>
-              <a:t>Can we convert our task-based matrix multiplication algorithm to use MPI?</a:t>
+              <a:t>Let’s attempt to implement a simple sum of integers using MPI.</a:t>
             </a:r>
             <a:endParaRPr lang="en-US" dirty="0"/>
           </a:p>

</xml_diff>

<commit_message>
Add scatter/gather to MPI lecture.
</commit_message>
<xml_diff>
--- a/Lectures/Introduction to MPI/Introduction to MPI.pptx
+++ b/Lectures/Introduction to MPI/Introduction to MPI.pptx
@@ -5,7 +5,7 @@
     <p:sldMasterId id="2147483660" r:id="rId1"/>
   </p:sldMasterIdLst>
   <p:notesMasterIdLst>
-    <p:notesMasterId r:id="rId25"/>
+    <p:notesMasterId r:id="rId28"/>
   </p:notesMasterIdLst>
   <p:sldIdLst>
     <p:sldId id="256" r:id="rId2"/>
@@ -31,6 +31,9 @@
     <p:sldId id="275" r:id="rId22"/>
     <p:sldId id="276" r:id="rId23"/>
     <p:sldId id="277" r:id="rId24"/>
+    <p:sldId id="279" r:id="rId25"/>
+    <p:sldId id="280" r:id="rId26"/>
+    <p:sldId id="281" r:id="rId27"/>
   </p:sldIdLst>
   <p:sldSz cx="9144000" cy="6858000" type="screen4x3"/>
   <p:notesSz cx="6858000" cy="9144000"/>
@@ -214,7 +217,7 @@
           <a:p>
             <a:fld id="{DBE0ECA1-3FBF-48AE-AD2A-4439AE745E19}" type="datetimeFigureOut">
               <a:rPr lang="en-US" smtClean="0"/>
-              <a:t>1/7/2014</a:t>
+              <a:t>1/9/2014</a:t>
             </a:fld>
             <a:endParaRPr lang="en-US"/>
           </a:p>
@@ -675,7 +678,7 @@
           <a:p>
             <a:fld id="{9769DED8-28D4-45B9-A00F-7CFE9335FEA6}" type="datetime1">
               <a:rPr lang="en-US" smtClean="0"/>
-              <a:t>1/7/2014</a:t>
+              <a:t>1/9/2014</a:t>
             </a:fld>
             <a:endParaRPr lang="en-US"/>
           </a:p>
@@ -940,7 +943,7 @@
           <a:p>
             <a:fld id="{2DB3D439-1F88-44B4-B5F7-F9BCD4064257}" type="datetime1">
               <a:rPr lang="en-US" smtClean="0"/>
-              <a:t>1/7/2014</a:t>
+              <a:t>1/9/2014</a:t>
             </a:fld>
             <a:endParaRPr lang="en-US"/>
           </a:p>
@@ -1115,7 +1118,7 @@
           <a:p>
             <a:fld id="{99C5638F-6F55-4055-935C-67841BE78C36}" type="datetime1">
               <a:rPr lang="en-US" smtClean="0"/>
-              <a:t>1/7/2014</a:t>
+              <a:t>1/9/2014</a:t>
             </a:fld>
             <a:endParaRPr lang="en-US"/>
           </a:p>
@@ -1280,7 +1283,7 @@
           <a:p>
             <a:fld id="{E6987D90-0C92-4B22-A29D-FED15412CED2}" type="datetime1">
               <a:rPr lang="en-US" smtClean="0"/>
-              <a:t>1/7/2014</a:t>
+              <a:t>1/9/2014</a:t>
             </a:fld>
             <a:endParaRPr lang="en-US"/>
           </a:p>
@@ -1529,7 +1532,7 @@
           <a:p>
             <a:fld id="{DDB67BC4-9554-49E0-BCB3-D1EF965BA0B8}" type="datetime1">
               <a:rPr lang="en-US" smtClean="0"/>
-              <a:t>1/7/2014</a:t>
+              <a:t>1/9/2014</a:t>
             </a:fld>
             <a:endParaRPr lang="en-US"/>
           </a:p>
@@ -1812,7 +1815,7 @@
           <a:p>
             <a:fld id="{EC24D770-803D-4E01-921C-9C100DD8230C}" type="datetime1">
               <a:rPr lang="en-US" smtClean="0"/>
-              <a:t>1/7/2014</a:t>
+              <a:t>1/9/2014</a:t>
             </a:fld>
             <a:endParaRPr lang="en-US"/>
           </a:p>
@@ -2251,7 +2254,7 @@
           <a:p>
             <a:fld id="{356AD44B-78A4-4209-8070-7DCBE2DC4992}" type="datetime1">
               <a:rPr lang="en-US" smtClean="0"/>
-              <a:t>1/7/2014</a:t>
+              <a:t>1/9/2014</a:t>
             </a:fld>
             <a:endParaRPr lang="en-US"/>
           </a:p>
@@ -2364,7 +2367,7 @@
           <a:p>
             <a:fld id="{A993C59A-7CA2-467F-B7F1-9096881A01B8}" type="datetime1">
               <a:rPr lang="en-US" smtClean="0"/>
-              <a:t>1/7/2014</a:t>
+              <a:t>1/9/2014</a:t>
             </a:fld>
             <a:endParaRPr lang="en-US"/>
           </a:p>
@@ -2454,7 +2457,7 @@
           <a:p>
             <a:fld id="{2B6B58D0-2488-434A-8ED1-692E09B85CC5}" type="datetime1">
               <a:rPr lang="en-US" smtClean="0"/>
-              <a:t>1/7/2014</a:t>
+              <a:t>1/9/2014</a:t>
             </a:fld>
             <a:endParaRPr lang="en-US"/>
           </a:p>
@@ -2696,7 +2699,7 @@
           <a:p>
             <a:fld id="{FDB0AFC2-7D64-4F61-A7B7-9932D3305DDA}" type="datetime1">
               <a:rPr lang="en-US" smtClean="0"/>
-              <a:t>1/7/2014</a:t>
+              <a:t>1/9/2014</a:t>
             </a:fld>
             <a:endParaRPr lang="en-US"/>
           </a:p>
@@ -2990,7 +2993,7 @@
           <a:p>
             <a:fld id="{4983D17A-D7B2-4ECE-8A2C-93679B9D177B}" type="datetime1">
               <a:rPr lang="en-US" smtClean="0"/>
-              <a:t>1/7/2014</a:t>
+              <a:t>1/9/2014</a:t>
             </a:fld>
             <a:endParaRPr lang="en-US"/>
           </a:p>
@@ -3284,7 +3287,7 @@
           <a:p>
             <a:fld id="{2A5275F7-419E-4C23-8A3D-2EE5742B2EC9}" type="datetime1">
               <a:rPr lang="en-US" smtClean="0"/>
-              <a:t>1/7/2014</a:t>
+              <a:t>1/9/2014</a:t>
             </a:fld>
             <a:endParaRPr lang="en-US"/>
           </a:p>
@@ -8613,6 +8616,1310 @@
     <p:extLst>
       <p:ext uri="{BB962C8B-B14F-4D97-AF65-F5344CB8AC3E}">
         <p14:creationId xmlns:p14="http://schemas.microsoft.com/office/powerpoint/2010/main" val="849104339"/>
+      </p:ext>
+    </p:extLst>
+  </p:cSld>
+  <p:clrMapOvr>
+    <a:masterClrMapping/>
+  </p:clrMapOvr>
+  <p:timing>
+    <p:tnLst>
+      <p:par>
+        <p:cTn id="1" dur="indefinite" restart="never" nodeType="tmRoot"/>
+      </p:par>
+    </p:tnLst>
+  </p:timing>
+</p:sld>
+</file>
+
+<file path=ppt/slides/slide24.xml><?xml version="1.0" encoding="utf-8"?>
+<p:sld xmlns:a="http://schemas.openxmlformats.org/drawingml/2006/main" xmlns:r="http://schemas.openxmlformats.org/officeDocument/2006/relationships" xmlns:p="http://schemas.openxmlformats.org/presentationml/2006/main">
+  <p:cSld>
+    <p:spTree>
+      <p:nvGrpSpPr>
+        <p:cNvPr id="1" name=""/>
+        <p:cNvGrpSpPr/>
+        <p:nvPr/>
+      </p:nvGrpSpPr>
+      <p:grpSpPr>
+        <a:xfrm>
+          <a:off x="0" y="0"/>
+          <a:ext cx="0" cy="0"/>
+          <a:chOff x="0" y="0"/>
+          <a:chExt cx="0" cy="0"/>
+        </a:xfrm>
+      </p:grpSpPr>
+      <p:sp>
+        <p:nvSpPr>
+          <p:cNvPr id="2" name="Title 1"/>
+          <p:cNvSpPr>
+            <a:spLocks noGrp="1"/>
+          </p:cNvSpPr>
+          <p:nvPr>
+            <p:ph type="title"/>
+          </p:nvPr>
+        </p:nvSpPr>
+        <p:spPr/>
+        <p:txBody>
+          <a:bodyPr/>
+          <a:lstStyle/>
+          <a:p>
+            <a:r>
+              <a:rPr lang="en-US" dirty="0" smtClean="0"/>
+              <a:t>Slightly more advanced MPI</a:t>
+            </a:r>
+            <a:endParaRPr lang="en-US" dirty="0"/>
+          </a:p>
+        </p:txBody>
+      </p:sp>
+      <p:sp>
+        <p:nvSpPr>
+          <p:cNvPr id="3" name="Content Placeholder 2"/>
+          <p:cNvSpPr>
+            <a:spLocks noGrp="1"/>
+          </p:cNvSpPr>
+          <p:nvPr>
+            <p:ph idx="1"/>
+          </p:nvPr>
+        </p:nvSpPr>
+        <p:spPr/>
+        <p:txBody>
+          <a:bodyPr>
+            <a:normAutofit/>
+          </a:bodyPr>
+          <a:lstStyle/>
+          <a:p>
+            <a:r>
+              <a:rPr lang="en-US" dirty="0" smtClean="0"/>
+              <a:t>This example is rather naïve, and won’t scale well.</a:t>
+            </a:r>
+          </a:p>
+          <a:p>
+            <a:pPr marL="800100" lvl="1" indent="-342900"/>
+            <a:r>
+              <a:rPr lang="en-US" dirty="0" smtClean="0"/>
+              <a:t>We use MPI when we need significant scalability</a:t>
+            </a:r>
+          </a:p>
+          <a:p>
+            <a:pPr marL="800100" lvl="1" indent="-342900"/>
+            <a:r>
+              <a:rPr lang="en-US" dirty="0" smtClean="0"/>
+              <a:t>Imagine scaling to hundreds or thousands of nodes</a:t>
+            </a:r>
+          </a:p>
+          <a:p>
+            <a:pPr marL="800100" lvl="1" indent="-342900"/>
+            <a:r>
+              <a:rPr lang="en-US" dirty="0" smtClean="0"/>
+              <a:t>Where is the bottleneck in the MPI Gauss code?</a:t>
+            </a:r>
+          </a:p>
+          <a:p>
+            <a:r>
+              <a:rPr lang="en-US" dirty="0">
+                <a:solidFill>
+                  <a:srgbClr val="7F0055"/>
+                </a:solidFill>
+                <a:latin typeface="Courier New" panose="02070309020205020404" pitchFamily="49" charset="0"/>
+                <a:cs typeface="Courier New" panose="02070309020205020404" pitchFamily="49" charset="0"/>
+              </a:rPr>
+              <a:t>for</a:t>
+            </a:r>
+            <a:r>
+              <a:rPr lang="en-US" dirty="0">
+                <a:latin typeface="Courier New" panose="02070309020205020404" pitchFamily="49" charset="0"/>
+                <a:cs typeface="Courier New" panose="02070309020205020404" pitchFamily="49" charset="0"/>
+              </a:rPr>
+              <a:t> (</a:t>
+            </a:r>
+            <a:r>
+              <a:rPr lang="en-US" dirty="0" err="1">
+                <a:solidFill>
+                  <a:srgbClr val="7F0055"/>
+                </a:solidFill>
+                <a:latin typeface="Courier New" panose="02070309020205020404" pitchFamily="49" charset="0"/>
+                <a:cs typeface="Courier New" panose="02070309020205020404" pitchFamily="49" charset="0"/>
+              </a:rPr>
+              <a:t>size_t</a:t>
+            </a:r>
+            <a:r>
+              <a:rPr lang="en-US" dirty="0">
+                <a:latin typeface="Courier New" panose="02070309020205020404" pitchFamily="49" charset="0"/>
+                <a:cs typeface="Courier New" panose="02070309020205020404" pitchFamily="49" charset="0"/>
+              </a:rPr>
+              <a:t> </a:t>
+            </a:r>
+            <a:r>
+              <a:rPr lang="en-US" dirty="0" err="1">
+                <a:latin typeface="Courier New" panose="02070309020205020404" pitchFamily="49" charset="0"/>
+                <a:cs typeface="Courier New" panose="02070309020205020404" pitchFamily="49" charset="0"/>
+              </a:rPr>
+              <a:t>i</a:t>
+            </a:r>
+            <a:r>
+              <a:rPr lang="en-US" dirty="0">
+                <a:latin typeface="Courier New" panose="02070309020205020404" pitchFamily="49" charset="0"/>
+                <a:cs typeface="Courier New" panose="02070309020205020404" pitchFamily="49" charset="0"/>
+              </a:rPr>
+              <a:t> = 1; </a:t>
+            </a:r>
+            <a:r>
+              <a:rPr lang="en-US" dirty="0" err="1">
+                <a:latin typeface="Courier New" panose="02070309020205020404" pitchFamily="49" charset="0"/>
+                <a:cs typeface="Courier New" panose="02070309020205020404" pitchFamily="49" charset="0"/>
+              </a:rPr>
+              <a:t>i</a:t>
+            </a:r>
+            <a:r>
+              <a:rPr lang="en-US" dirty="0">
+                <a:latin typeface="Courier New" panose="02070309020205020404" pitchFamily="49" charset="0"/>
+                <a:cs typeface="Courier New" panose="02070309020205020404" pitchFamily="49" charset="0"/>
+              </a:rPr>
+              <a:t> &lt; </a:t>
+            </a:r>
+            <a:r>
+              <a:rPr lang="en-US" dirty="0" err="1">
+                <a:latin typeface="Courier New" panose="02070309020205020404" pitchFamily="49" charset="0"/>
+                <a:cs typeface="Courier New" panose="02070309020205020404" pitchFamily="49" charset="0"/>
+              </a:rPr>
+              <a:t>partitions.size</a:t>
+            </a:r>
+            <a:r>
+              <a:rPr lang="en-US" dirty="0">
+                <a:latin typeface="Courier New" panose="02070309020205020404" pitchFamily="49" charset="0"/>
+                <a:cs typeface="Courier New" panose="02070309020205020404" pitchFamily="49" charset="0"/>
+              </a:rPr>
+              <a:t>(); ++</a:t>
+            </a:r>
+            <a:r>
+              <a:rPr lang="en-US" dirty="0" err="1">
+                <a:latin typeface="Courier New" panose="02070309020205020404" pitchFamily="49" charset="0"/>
+                <a:cs typeface="Courier New" panose="02070309020205020404" pitchFamily="49" charset="0"/>
+              </a:rPr>
+              <a:t>i</a:t>
+            </a:r>
+            <a:r>
+              <a:rPr lang="en-US" dirty="0">
+                <a:latin typeface="Courier New" panose="02070309020205020404" pitchFamily="49" charset="0"/>
+                <a:cs typeface="Courier New" panose="02070309020205020404" pitchFamily="49" charset="0"/>
+              </a:rPr>
+              <a:t>) </a:t>
+            </a:r>
+            <a:r>
+              <a:rPr lang="en-US" dirty="0" smtClean="0">
+                <a:latin typeface="Courier New" panose="02070309020205020404" pitchFamily="49" charset="0"/>
+                <a:cs typeface="Courier New" panose="02070309020205020404" pitchFamily="49" charset="0"/>
+              </a:rPr>
+              <a:t>{</a:t>
+            </a:r>
+          </a:p>
+          <a:p>
+            <a:r>
+              <a:rPr lang="en-US" dirty="0">
+                <a:latin typeface="Courier New" panose="02070309020205020404" pitchFamily="49" charset="0"/>
+                <a:cs typeface="Courier New" panose="02070309020205020404" pitchFamily="49" charset="0"/>
+              </a:rPr>
+              <a:t> </a:t>
+            </a:r>
+            <a:r>
+              <a:rPr lang="en-US" dirty="0" smtClean="0">
+                <a:latin typeface="Courier New" panose="02070309020205020404" pitchFamily="49" charset="0"/>
+                <a:cs typeface="Courier New" panose="02070309020205020404" pitchFamily="49" charset="0"/>
+              </a:rPr>
+              <a:t> </a:t>
+            </a:r>
+            <a:r>
+              <a:rPr lang="en-US" dirty="0" err="1" smtClean="0">
+                <a:latin typeface="Courier New" panose="02070309020205020404" pitchFamily="49" charset="0"/>
+                <a:cs typeface="Courier New" panose="02070309020205020404" pitchFamily="49" charset="0"/>
+              </a:rPr>
+              <a:t>iterator_values</a:t>
+            </a:r>
+            <a:r>
+              <a:rPr lang="en-US" dirty="0" smtClean="0">
+                <a:latin typeface="Courier New" panose="02070309020205020404" pitchFamily="49" charset="0"/>
+                <a:cs typeface="Courier New" panose="02070309020205020404" pitchFamily="49" charset="0"/>
+              </a:rPr>
+              <a:t>[0</a:t>
+            </a:r>
+            <a:r>
+              <a:rPr lang="en-US" dirty="0">
+                <a:latin typeface="Courier New" panose="02070309020205020404" pitchFamily="49" charset="0"/>
+                <a:cs typeface="Courier New" panose="02070309020205020404" pitchFamily="49" charset="0"/>
+              </a:rPr>
+              <a:t>] = partitions[</a:t>
+            </a:r>
+            <a:r>
+              <a:rPr lang="en-US" dirty="0" err="1">
+                <a:latin typeface="Courier New" panose="02070309020205020404" pitchFamily="49" charset="0"/>
+                <a:cs typeface="Courier New" panose="02070309020205020404" pitchFamily="49" charset="0"/>
+              </a:rPr>
+              <a:t>i</a:t>
+            </a:r>
+            <a:r>
+              <a:rPr lang="en-US" dirty="0">
+                <a:latin typeface="Courier New" panose="02070309020205020404" pitchFamily="49" charset="0"/>
+                <a:cs typeface="Courier New" panose="02070309020205020404" pitchFamily="49" charset="0"/>
+              </a:rPr>
+              <a:t>].</a:t>
+            </a:r>
+            <a:r>
+              <a:rPr lang="en-US" dirty="0" smtClean="0">
+                <a:latin typeface="Courier New" panose="02070309020205020404" pitchFamily="49" charset="0"/>
+                <a:cs typeface="Courier New" panose="02070309020205020404" pitchFamily="49" charset="0"/>
+              </a:rPr>
+              <a:t>first;</a:t>
+            </a:r>
+          </a:p>
+          <a:p>
+            <a:r>
+              <a:rPr lang="en-US" dirty="0" smtClean="0">
+                <a:latin typeface="Courier New" panose="02070309020205020404" pitchFamily="49" charset="0"/>
+                <a:cs typeface="Courier New" panose="02070309020205020404" pitchFamily="49" charset="0"/>
+              </a:rPr>
+              <a:t>  </a:t>
+            </a:r>
+            <a:r>
+              <a:rPr lang="en-US" dirty="0" err="1" smtClean="0">
+                <a:latin typeface="Courier New" panose="02070309020205020404" pitchFamily="49" charset="0"/>
+                <a:cs typeface="Courier New" panose="02070309020205020404" pitchFamily="49" charset="0"/>
+              </a:rPr>
+              <a:t>iterator_values</a:t>
+            </a:r>
+            <a:r>
+              <a:rPr lang="en-US" dirty="0" smtClean="0">
+                <a:latin typeface="Courier New" panose="02070309020205020404" pitchFamily="49" charset="0"/>
+                <a:cs typeface="Courier New" panose="02070309020205020404" pitchFamily="49" charset="0"/>
+              </a:rPr>
+              <a:t>[1</a:t>
+            </a:r>
+            <a:r>
+              <a:rPr lang="en-US" dirty="0">
+                <a:latin typeface="Courier New" panose="02070309020205020404" pitchFamily="49" charset="0"/>
+                <a:cs typeface="Courier New" panose="02070309020205020404" pitchFamily="49" charset="0"/>
+              </a:rPr>
+              <a:t>] = partitions[</a:t>
+            </a:r>
+            <a:r>
+              <a:rPr lang="en-US" dirty="0" err="1">
+                <a:latin typeface="Courier New" panose="02070309020205020404" pitchFamily="49" charset="0"/>
+                <a:cs typeface="Courier New" panose="02070309020205020404" pitchFamily="49" charset="0"/>
+              </a:rPr>
+              <a:t>i</a:t>
+            </a:r>
+            <a:r>
+              <a:rPr lang="en-US" dirty="0">
+                <a:latin typeface="Courier New" panose="02070309020205020404" pitchFamily="49" charset="0"/>
+                <a:cs typeface="Courier New" panose="02070309020205020404" pitchFamily="49" charset="0"/>
+              </a:rPr>
+              <a:t>].</a:t>
+            </a:r>
+            <a:r>
+              <a:rPr lang="en-US" dirty="0" smtClean="0">
+                <a:latin typeface="Courier New" panose="02070309020205020404" pitchFamily="49" charset="0"/>
+                <a:cs typeface="Courier New" panose="02070309020205020404" pitchFamily="49" charset="0"/>
+              </a:rPr>
+              <a:t>second;</a:t>
+            </a:r>
+          </a:p>
+          <a:p>
+            <a:r>
+              <a:rPr lang="en-US" dirty="0">
+                <a:latin typeface="Courier New" panose="02070309020205020404" pitchFamily="49" charset="0"/>
+                <a:cs typeface="Courier New" panose="02070309020205020404" pitchFamily="49" charset="0"/>
+              </a:rPr>
+              <a:t> </a:t>
+            </a:r>
+            <a:r>
+              <a:rPr lang="en-US" dirty="0" smtClean="0">
+                <a:latin typeface="Courier New" panose="02070309020205020404" pitchFamily="49" charset="0"/>
+                <a:cs typeface="Courier New" panose="02070309020205020404" pitchFamily="49" charset="0"/>
+              </a:rPr>
+              <a:t> mpi_interface</a:t>
+            </a:r>
+            <a:r>
+              <a:rPr lang="en-US" dirty="0">
+                <a:latin typeface="Courier New" panose="02070309020205020404" pitchFamily="49" charset="0"/>
+                <a:cs typeface="Courier New" panose="02070309020205020404" pitchFamily="49" charset="0"/>
+              </a:rPr>
+              <a:t>_.</a:t>
+            </a:r>
+            <a:r>
+              <a:rPr lang="en-US" dirty="0" err="1">
+                <a:latin typeface="Courier New" panose="02070309020205020404" pitchFamily="49" charset="0"/>
+                <a:cs typeface="Courier New" panose="02070309020205020404" pitchFamily="49" charset="0"/>
+              </a:rPr>
+              <a:t>MpiSend</a:t>
+            </a:r>
+            <a:r>
+              <a:rPr lang="en-US" dirty="0">
+                <a:latin typeface="Courier New" panose="02070309020205020404" pitchFamily="49" charset="0"/>
+                <a:cs typeface="Courier New" panose="02070309020205020404" pitchFamily="49" charset="0"/>
+              </a:rPr>
+              <a:t>(&amp;</a:t>
+            </a:r>
+            <a:r>
+              <a:rPr lang="en-US" dirty="0" err="1">
+                <a:latin typeface="Courier New" panose="02070309020205020404" pitchFamily="49" charset="0"/>
+                <a:cs typeface="Courier New" panose="02070309020205020404" pitchFamily="49" charset="0"/>
+              </a:rPr>
+              <a:t>iterator_values</a:t>
+            </a:r>
+            <a:r>
+              <a:rPr lang="en-US" dirty="0">
+                <a:latin typeface="Courier New" panose="02070309020205020404" pitchFamily="49" charset="0"/>
+                <a:cs typeface="Courier New" panose="02070309020205020404" pitchFamily="49" charset="0"/>
+              </a:rPr>
+              <a:t>[0], </a:t>
+            </a:r>
+            <a:r>
+              <a:rPr lang="en-US" dirty="0" smtClean="0">
+                <a:latin typeface="Courier New" panose="02070309020205020404" pitchFamily="49" charset="0"/>
+                <a:cs typeface="Courier New" panose="02070309020205020404" pitchFamily="49" charset="0"/>
+              </a:rPr>
+              <a:t>2,</a:t>
+            </a:r>
+          </a:p>
+          <a:p>
+            <a:r>
+              <a:rPr lang="en-US" dirty="0">
+                <a:latin typeface="Courier New" panose="02070309020205020404" pitchFamily="49" charset="0"/>
+                <a:cs typeface="Courier New" panose="02070309020205020404" pitchFamily="49" charset="0"/>
+              </a:rPr>
+              <a:t> </a:t>
+            </a:r>
+            <a:r>
+              <a:rPr lang="en-US" dirty="0" smtClean="0">
+                <a:latin typeface="Courier New" panose="02070309020205020404" pitchFamily="49" charset="0"/>
+                <a:cs typeface="Courier New" panose="02070309020205020404" pitchFamily="49" charset="0"/>
+              </a:rPr>
+              <a:t>           MPI_UINT32_T</a:t>
+            </a:r>
+            <a:r>
+              <a:rPr lang="en-US" dirty="0">
+                <a:latin typeface="Courier New" panose="02070309020205020404" pitchFamily="49" charset="0"/>
+                <a:cs typeface="Courier New" panose="02070309020205020404" pitchFamily="49" charset="0"/>
+              </a:rPr>
+              <a:t>, </a:t>
+            </a:r>
+            <a:r>
+              <a:rPr lang="en-US" dirty="0" err="1">
+                <a:latin typeface="Courier New" panose="02070309020205020404" pitchFamily="49" charset="0"/>
+                <a:cs typeface="Courier New" panose="02070309020205020404" pitchFamily="49" charset="0"/>
+              </a:rPr>
+              <a:t>i</a:t>
+            </a:r>
+            <a:r>
+              <a:rPr lang="en-US" dirty="0">
+                <a:latin typeface="Courier New" panose="02070309020205020404" pitchFamily="49" charset="0"/>
+                <a:cs typeface="Courier New" panose="02070309020205020404" pitchFamily="49" charset="0"/>
+              </a:rPr>
+              <a:t>, 0, MPI_COMM_WORLD</a:t>
+            </a:r>
+            <a:r>
+              <a:rPr lang="en-US" dirty="0" smtClean="0">
+                <a:latin typeface="Courier New" panose="02070309020205020404" pitchFamily="49" charset="0"/>
+                <a:cs typeface="Courier New" panose="02070309020205020404" pitchFamily="49" charset="0"/>
+              </a:rPr>
+              <a:t>);</a:t>
+            </a:r>
+          </a:p>
+          <a:p>
+            <a:r>
+              <a:rPr lang="en-US" dirty="0" smtClean="0">
+                <a:latin typeface="Courier New" panose="02070309020205020404" pitchFamily="49" charset="0"/>
+                <a:cs typeface="Courier New" panose="02070309020205020404" pitchFamily="49" charset="0"/>
+              </a:rPr>
+              <a:t>}</a:t>
+            </a:r>
+            <a:endParaRPr lang="en-US" dirty="0">
+              <a:latin typeface="Courier New" panose="02070309020205020404" pitchFamily="49" charset="0"/>
+              <a:cs typeface="Courier New" panose="02070309020205020404" pitchFamily="49" charset="0"/>
+            </a:endParaRPr>
+          </a:p>
+        </p:txBody>
+      </p:sp>
+      <p:sp>
+        <p:nvSpPr>
+          <p:cNvPr id="4" name="Slide Number Placeholder 3"/>
+          <p:cNvSpPr>
+            <a:spLocks noGrp="1"/>
+          </p:cNvSpPr>
+          <p:nvPr>
+            <p:ph type="sldNum" sz="quarter" idx="12"/>
+          </p:nvPr>
+        </p:nvSpPr>
+        <p:spPr/>
+        <p:txBody>
+          <a:bodyPr/>
+          <a:lstStyle/>
+          <a:p>
+            <a:fld id="{6DA12B36-9664-4CB0-8B2E-F4A2F44AE97E}" type="slidenum">
+              <a:rPr lang="en-US" smtClean="0"/>
+              <a:t>24</a:t>
+            </a:fld>
+            <a:endParaRPr lang="en-US"/>
+          </a:p>
+        </p:txBody>
+      </p:sp>
+    </p:spTree>
+    <p:extLst>
+      <p:ext uri="{BB962C8B-B14F-4D97-AF65-F5344CB8AC3E}">
+        <p14:creationId xmlns:p14="http://schemas.microsoft.com/office/powerpoint/2010/main" val="3747614523"/>
+      </p:ext>
+    </p:extLst>
+  </p:cSld>
+  <p:clrMapOvr>
+    <a:masterClrMapping/>
+  </p:clrMapOvr>
+  <p:timing>
+    <p:tnLst>
+      <p:par>
+        <p:cTn id="1" dur="indefinite" restart="never" nodeType="tmRoot">
+          <p:childTnLst>
+            <p:seq concurrent="1" nextAc="seek">
+              <p:cTn id="2" dur="indefinite" nodeType="mainSeq">
+                <p:childTnLst>
+                  <p:par>
+                    <p:cTn id="3" fill="hold">
+                      <p:stCondLst>
+                        <p:cond delay="indefinite"/>
+                      </p:stCondLst>
+                      <p:childTnLst>
+                        <p:par>
+                          <p:cTn id="4" fill="hold">
+                            <p:stCondLst>
+                              <p:cond delay="0"/>
+                            </p:stCondLst>
+                            <p:childTnLst>
+                              <p:par>
+                                <p:cTn id="5" presetID="1" presetClass="entr" presetSubtype="0" fill="hold" nodeType="clickEffect">
+                                  <p:stCondLst>
+                                    <p:cond delay="0"/>
+                                  </p:stCondLst>
+                                  <p:childTnLst>
+                                    <p:set>
+                                      <p:cBhvr>
+                                        <p:cTn id="6" dur="1" fill="hold">
+                                          <p:stCondLst>
+                                            <p:cond delay="0"/>
+                                          </p:stCondLst>
+                                        </p:cTn>
+                                        <p:tgtEl>
+                                          <p:spTgt spid="3">
+                                            <p:txEl>
+                                              <p:pRg st="4" end="4"/>
+                                            </p:txEl>
+                                          </p:spTgt>
+                                        </p:tgtEl>
+                                        <p:attrNameLst>
+                                          <p:attrName>style.visibility</p:attrName>
+                                        </p:attrNameLst>
+                                      </p:cBhvr>
+                                      <p:to>
+                                        <p:strVal val="visible"/>
+                                      </p:to>
+                                    </p:set>
+                                  </p:childTnLst>
+                                </p:cTn>
+                              </p:par>
+                              <p:par>
+                                <p:cTn id="7" presetID="1" presetClass="entr" presetSubtype="0" fill="hold" nodeType="withEffect">
+                                  <p:stCondLst>
+                                    <p:cond delay="0"/>
+                                  </p:stCondLst>
+                                  <p:childTnLst>
+                                    <p:set>
+                                      <p:cBhvr>
+                                        <p:cTn id="8" dur="1" fill="hold">
+                                          <p:stCondLst>
+                                            <p:cond delay="0"/>
+                                          </p:stCondLst>
+                                        </p:cTn>
+                                        <p:tgtEl>
+                                          <p:spTgt spid="3">
+                                            <p:txEl>
+                                              <p:pRg st="5" end="5"/>
+                                            </p:txEl>
+                                          </p:spTgt>
+                                        </p:tgtEl>
+                                        <p:attrNameLst>
+                                          <p:attrName>style.visibility</p:attrName>
+                                        </p:attrNameLst>
+                                      </p:cBhvr>
+                                      <p:to>
+                                        <p:strVal val="visible"/>
+                                      </p:to>
+                                    </p:set>
+                                  </p:childTnLst>
+                                </p:cTn>
+                              </p:par>
+                              <p:par>
+                                <p:cTn id="9" presetID="1" presetClass="entr" presetSubtype="0" fill="hold" nodeType="withEffect">
+                                  <p:stCondLst>
+                                    <p:cond delay="0"/>
+                                  </p:stCondLst>
+                                  <p:childTnLst>
+                                    <p:set>
+                                      <p:cBhvr>
+                                        <p:cTn id="10" dur="1" fill="hold">
+                                          <p:stCondLst>
+                                            <p:cond delay="0"/>
+                                          </p:stCondLst>
+                                        </p:cTn>
+                                        <p:tgtEl>
+                                          <p:spTgt spid="3">
+                                            <p:txEl>
+                                              <p:pRg st="6" end="6"/>
+                                            </p:txEl>
+                                          </p:spTgt>
+                                        </p:tgtEl>
+                                        <p:attrNameLst>
+                                          <p:attrName>style.visibility</p:attrName>
+                                        </p:attrNameLst>
+                                      </p:cBhvr>
+                                      <p:to>
+                                        <p:strVal val="visible"/>
+                                      </p:to>
+                                    </p:set>
+                                  </p:childTnLst>
+                                </p:cTn>
+                              </p:par>
+                              <p:par>
+                                <p:cTn id="11" presetID="1" presetClass="entr" presetSubtype="0" fill="hold" nodeType="withEffect">
+                                  <p:stCondLst>
+                                    <p:cond delay="0"/>
+                                  </p:stCondLst>
+                                  <p:childTnLst>
+                                    <p:set>
+                                      <p:cBhvr>
+                                        <p:cTn id="12" dur="1" fill="hold">
+                                          <p:stCondLst>
+                                            <p:cond delay="0"/>
+                                          </p:stCondLst>
+                                        </p:cTn>
+                                        <p:tgtEl>
+                                          <p:spTgt spid="3">
+                                            <p:txEl>
+                                              <p:pRg st="7" end="7"/>
+                                            </p:txEl>
+                                          </p:spTgt>
+                                        </p:tgtEl>
+                                        <p:attrNameLst>
+                                          <p:attrName>style.visibility</p:attrName>
+                                        </p:attrNameLst>
+                                      </p:cBhvr>
+                                      <p:to>
+                                        <p:strVal val="visible"/>
+                                      </p:to>
+                                    </p:set>
+                                  </p:childTnLst>
+                                </p:cTn>
+                              </p:par>
+                              <p:par>
+                                <p:cTn id="13" presetID="1" presetClass="entr" presetSubtype="0" fill="hold" nodeType="withEffect">
+                                  <p:stCondLst>
+                                    <p:cond delay="0"/>
+                                  </p:stCondLst>
+                                  <p:childTnLst>
+                                    <p:set>
+                                      <p:cBhvr>
+                                        <p:cTn id="14" dur="1" fill="hold">
+                                          <p:stCondLst>
+                                            <p:cond delay="0"/>
+                                          </p:stCondLst>
+                                        </p:cTn>
+                                        <p:tgtEl>
+                                          <p:spTgt spid="3">
+                                            <p:txEl>
+                                              <p:pRg st="8" end="8"/>
+                                            </p:txEl>
+                                          </p:spTgt>
+                                        </p:tgtEl>
+                                        <p:attrNameLst>
+                                          <p:attrName>style.visibility</p:attrName>
+                                        </p:attrNameLst>
+                                      </p:cBhvr>
+                                      <p:to>
+                                        <p:strVal val="visible"/>
+                                      </p:to>
+                                    </p:set>
+                                  </p:childTnLst>
+                                </p:cTn>
+                              </p:par>
+                              <p:par>
+                                <p:cTn id="15" presetID="1" presetClass="entr" presetSubtype="0" fill="hold" nodeType="withEffect">
+                                  <p:stCondLst>
+                                    <p:cond delay="0"/>
+                                  </p:stCondLst>
+                                  <p:childTnLst>
+                                    <p:set>
+                                      <p:cBhvr>
+                                        <p:cTn id="16" dur="1" fill="hold">
+                                          <p:stCondLst>
+                                            <p:cond delay="0"/>
+                                          </p:stCondLst>
+                                        </p:cTn>
+                                        <p:tgtEl>
+                                          <p:spTgt spid="3">
+                                            <p:txEl>
+                                              <p:pRg st="9" end="9"/>
+                                            </p:txEl>
+                                          </p:spTgt>
+                                        </p:tgtEl>
+                                        <p:attrNameLst>
+                                          <p:attrName>style.visibility</p:attrName>
+                                        </p:attrNameLst>
+                                      </p:cBhvr>
+                                      <p:to>
+                                        <p:strVal val="visible"/>
+                                      </p:to>
+                                    </p:set>
+                                  </p:childTnLst>
+                                </p:cTn>
+                              </p:par>
+                            </p:childTnLst>
+                          </p:cTn>
+                        </p:par>
+                      </p:childTnLst>
+                    </p:cTn>
+                  </p:par>
+                </p:childTnLst>
+              </p:cTn>
+              <p:prevCondLst>
+                <p:cond evt="onPrev" delay="0">
+                  <p:tgtEl>
+                    <p:sldTgt/>
+                  </p:tgtEl>
+                </p:cond>
+              </p:prevCondLst>
+              <p:nextCondLst>
+                <p:cond evt="onNext" delay="0">
+                  <p:tgtEl>
+                    <p:sldTgt/>
+                  </p:tgtEl>
+                </p:cond>
+              </p:nextCondLst>
+            </p:seq>
+          </p:childTnLst>
+        </p:cTn>
+      </p:par>
+    </p:tnLst>
+  </p:timing>
+</p:sld>
+</file>
+
+<file path=ppt/slides/slide25.xml><?xml version="1.0" encoding="utf-8"?>
+<p:sld xmlns:a="http://schemas.openxmlformats.org/drawingml/2006/main" xmlns:r="http://schemas.openxmlformats.org/officeDocument/2006/relationships" xmlns:p="http://schemas.openxmlformats.org/presentationml/2006/main">
+  <p:cSld>
+    <p:spTree>
+      <p:nvGrpSpPr>
+        <p:cNvPr id="1" name=""/>
+        <p:cNvGrpSpPr/>
+        <p:nvPr/>
+      </p:nvGrpSpPr>
+      <p:grpSpPr>
+        <a:xfrm>
+          <a:off x="0" y="0"/>
+          <a:ext cx="0" cy="0"/>
+          <a:chOff x="0" y="0"/>
+          <a:chExt cx="0" cy="0"/>
+        </a:xfrm>
+      </p:grpSpPr>
+      <p:sp>
+        <p:nvSpPr>
+          <p:cNvPr id="2" name="Title 1"/>
+          <p:cNvSpPr>
+            <a:spLocks noGrp="1"/>
+          </p:cNvSpPr>
+          <p:nvPr>
+            <p:ph type="title"/>
+          </p:nvPr>
+        </p:nvSpPr>
+        <p:spPr/>
+        <p:txBody>
+          <a:bodyPr/>
+          <a:lstStyle/>
+          <a:p>
+            <a:r>
+              <a:rPr lang="en-US" dirty="0" smtClean="0"/>
+              <a:t>Why is MPI_Send a bottleneck?</a:t>
+            </a:r>
+            <a:endParaRPr lang="en-US" dirty="0"/>
+          </a:p>
+        </p:txBody>
+      </p:sp>
+      <p:sp>
+        <p:nvSpPr>
+          <p:cNvPr id="3" name="Content Placeholder 2"/>
+          <p:cNvSpPr>
+            <a:spLocks noGrp="1"/>
+          </p:cNvSpPr>
+          <p:nvPr>
+            <p:ph idx="1"/>
+          </p:nvPr>
+        </p:nvSpPr>
+        <p:spPr/>
+        <p:txBody>
+          <a:bodyPr/>
+          <a:lstStyle/>
+          <a:p>
+            <a:r>
+              <a:rPr lang="en-US" dirty="0" smtClean="0"/>
+              <a:t>With </a:t>
+            </a:r>
+            <a:r>
+              <a:rPr lang="en-US" i="1" dirty="0" smtClean="0"/>
+              <a:t>n</a:t>
+            </a:r>
+            <a:r>
+              <a:rPr lang="en-US" dirty="0" smtClean="0"/>
+              <a:t> nodes, this code must call MPI_Send </a:t>
+            </a:r>
+            <a:r>
+              <a:rPr lang="en-US" i="1" dirty="0" smtClean="0"/>
+              <a:t>n</a:t>
+            </a:r>
+            <a:r>
+              <a:rPr lang="en-US" dirty="0" smtClean="0"/>
+              <a:t> times, and wait for each </a:t>
+            </a:r>
+            <a:r>
+              <a:rPr lang="en-US" i="1" dirty="0" smtClean="0"/>
+              <a:t>n</a:t>
+            </a:r>
+            <a:r>
+              <a:rPr lang="en-US" dirty="0" smtClean="0"/>
+              <a:t> node to respond.</a:t>
+            </a:r>
+          </a:p>
+          <a:p>
+            <a:pPr marL="800100" lvl="1" indent="-342900"/>
+            <a:r>
+              <a:rPr lang="en-US" dirty="0" smtClean="0"/>
+              <a:t>This portion of the must execute serially.</a:t>
+            </a:r>
+          </a:p>
+          <a:p>
+            <a:pPr marL="800100" lvl="1" indent="-342900"/>
+            <a:r>
+              <a:rPr lang="en-US" dirty="0" smtClean="0"/>
+              <a:t>This portion of the code will be slow.</a:t>
+            </a:r>
+          </a:p>
+          <a:p>
+            <a:pPr marL="342900" indent="-342900"/>
+            <a:r>
+              <a:rPr lang="en-US" dirty="0" smtClean="0"/>
+              <a:t>Consider this analogy:</a:t>
+            </a:r>
+          </a:p>
+          <a:p>
+            <a:pPr marL="800100" lvl="1" indent="-342900"/>
+            <a:r>
+              <a:rPr lang="en-US" b="0" dirty="0"/>
+              <a:t>L1 cache: it's on your desk, pick it up.</a:t>
+            </a:r>
+          </a:p>
+          <a:p>
+            <a:pPr marL="800100" lvl="1" indent="-342900"/>
+            <a:r>
+              <a:rPr lang="en-US" b="0" dirty="0"/>
+              <a:t>L2 cache: it's on the bookshelf in your office, get up out of the chair.</a:t>
+            </a:r>
+          </a:p>
+          <a:p>
+            <a:pPr marL="800100" lvl="1" indent="-342900"/>
+            <a:r>
+              <a:rPr lang="en-US" b="0" dirty="0"/>
+              <a:t>Main memory: it's on the shelf in your garage downstairs, might as well get a snack while you're down there.</a:t>
+            </a:r>
+          </a:p>
+          <a:p>
+            <a:pPr marL="800100" lvl="1" indent="-342900"/>
+            <a:r>
+              <a:rPr lang="en-US" b="0" dirty="0" smtClean="0"/>
+              <a:t>Disk/Network: </a:t>
+            </a:r>
+            <a:r>
+              <a:rPr lang="en-US" b="0" dirty="0"/>
+              <a:t>it's in, um, California. Walk there. Walk back. Really</a:t>
+            </a:r>
+            <a:r>
+              <a:rPr lang="en-US" b="0" dirty="0" smtClean="0"/>
+              <a:t>.</a:t>
+            </a:r>
+            <a:endParaRPr lang="en-US" b="0" dirty="0"/>
+          </a:p>
+          <a:p>
+            <a:pPr marL="342900" indent="-342900"/>
+            <a:endParaRPr lang="en-US" dirty="0"/>
+          </a:p>
+        </p:txBody>
+      </p:sp>
+      <p:sp>
+        <p:nvSpPr>
+          <p:cNvPr id="4" name="Slide Number Placeholder 3"/>
+          <p:cNvSpPr>
+            <a:spLocks noGrp="1"/>
+          </p:cNvSpPr>
+          <p:nvPr>
+            <p:ph type="sldNum" sz="quarter" idx="12"/>
+          </p:nvPr>
+        </p:nvSpPr>
+        <p:spPr/>
+        <p:txBody>
+          <a:bodyPr/>
+          <a:lstStyle/>
+          <a:p>
+            <a:fld id="{6DA12B36-9664-4CB0-8B2E-F4A2F44AE97E}" type="slidenum">
+              <a:rPr lang="en-US" smtClean="0"/>
+              <a:t>25</a:t>
+            </a:fld>
+            <a:endParaRPr lang="en-US"/>
+          </a:p>
+        </p:txBody>
+      </p:sp>
+      <p:sp>
+        <p:nvSpPr>
+          <p:cNvPr id="5" name="Footer Placeholder 4"/>
+          <p:cNvSpPr>
+            <a:spLocks noGrp="1"/>
+          </p:cNvSpPr>
+          <p:nvPr>
+            <p:ph type="ftr" sz="quarter" idx="11"/>
+          </p:nvPr>
+        </p:nvSpPr>
+        <p:spPr>
+          <a:xfrm>
+            <a:off x="457200" y="6477000"/>
+            <a:ext cx="5638800" cy="299721"/>
+          </a:xfrm>
+        </p:spPr>
+        <p:txBody>
+          <a:bodyPr/>
+          <a:lstStyle/>
+          <a:p>
+            <a:r>
+              <a:rPr lang="en-US" dirty="0" smtClean="0"/>
+              <a:t>Source: http://hacksoflife.blogspot.com/2011/04/going-to-california-with-aching-in-my.html</a:t>
+            </a:r>
+            <a:endParaRPr lang="en-US" dirty="0"/>
+          </a:p>
+        </p:txBody>
+      </p:sp>
+    </p:spTree>
+    <p:extLst>
+      <p:ext uri="{BB962C8B-B14F-4D97-AF65-F5344CB8AC3E}">
+        <p14:creationId xmlns:p14="http://schemas.microsoft.com/office/powerpoint/2010/main" val="772341944"/>
+      </p:ext>
+    </p:extLst>
+  </p:cSld>
+  <p:clrMapOvr>
+    <a:masterClrMapping/>
+  </p:clrMapOvr>
+  <p:timing>
+    <p:tnLst>
+      <p:par>
+        <p:cTn id="1" dur="indefinite" restart="never" nodeType="tmRoot">
+          <p:childTnLst>
+            <p:seq concurrent="1" nextAc="seek">
+              <p:cTn id="2" dur="indefinite" nodeType="mainSeq">
+                <p:childTnLst>
+                  <p:par>
+                    <p:cTn id="3" fill="hold">
+                      <p:stCondLst>
+                        <p:cond delay="indefinite"/>
+                      </p:stCondLst>
+                      <p:childTnLst>
+                        <p:par>
+                          <p:cTn id="4" fill="hold">
+                            <p:stCondLst>
+                              <p:cond delay="0"/>
+                            </p:stCondLst>
+                            <p:childTnLst>
+                              <p:par>
+                                <p:cTn id="5" presetID="1" presetClass="entr" presetSubtype="0" fill="hold" nodeType="clickEffect">
+                                  <p:stCondLst>
+                                    <p:cond delay="0"/>
+                                  </p:stCondLst>
+                                  <p:childTnLst>
+                                    <p:set>
+                                      <p:cBhvr>
+                                        <p:cTn id="6" dur="1" fill="hold">
+                                          <p:stCondLst>
+                                            <p:cond delay="0"/>
+                                          </p:stCondLst>
+                                        </p:cTn>
+                                        <p:tgtEl>
+                                          <p:spTgt spid="3">
+                                            <p:txEl>
+                                              <p:pRg st="4" end="4"/>
+                                            </p:txEl>
+                                          </p:spTgt>
+                                        </p:tgtEl>
+                                        <p:attrNameLst>
+                                          <p:attrName>style.visibility</p:attrName>
+                                        </p:attrNameLst>
+                                      </p:cBhvr>
+                                      <p:to>
+                                        <p:strVal val="visible"/>
+                                      </p:to>
+                                    </p:set>
+                                  </p:childTnLst>
+                                </p:cTn>
+                              </p:par>
+                            </p:childTnLst>
+                          </p:cTn>
+                        </p:par>
+                      </p:childTnLst>
+                    </p:cTn>
+                  </p:par>
+                  <p:par>
+                    <p:cTn id="7" fill="hold">
+                      <p:stCondLst>
+                        <p:cond delay="indefinite"/>
+                      </p:stCondLst>
+                      <p:childTnLst>
+                        <p:par>
+                          <p:cTn id="8" fill="hold">
+                            <p:stCondLst>
+                              <p:cond delay="0"/>
+                            </p:stCondLst>
+                            <p:childTnLst>
+                              <p:par>
+                                <p:cTn id="9" presetID="1" presetClass="entr" presetSubtype="0" fill="hold" nodeType="clickEffect">
+                                  <p:stCondLst>
+                                    <p:cond delay="0"/>
+                                  </p:stCondLst>
+                                  <p:childTnLst>
+                                    <p:set>
+                                      <p:cBhvr>
+                                        <p:cTn id="10" dur="1" fill="hold">
+                                          <p:stCondLst>
+                                            <p:cond delay="0"/>
+                                          </p:stCondLst>
+                                        </p:cTn>
+                                        <p:tgtEl>
+                                          <p:spTgt spid="3">
+                                            <p:txEl>
+                                              <p:pRg st="5" end="5"/>
+                                            </p:txEl>
+                                          </p:spTgt>
+                                        </p:tgtEl>
+                                        <p:attrNameLst>
+                                          <p:attrName>style.visibility</p:attrName>
+                                        </p:attrNameLst>
+                                      </p:cBhvr>
+                                      <p:to>
+                                        <p:strVal val="visible"/>
+                                      </p:to>
+                                    </p:set>
+                                  </p:childTnLst>
+                                </p:cTn>
+                              </p:par>
+                            </p:childTnLst>
+                          </p:cTn>
+                        </p:par>
+                      </p:childTnLst>
+                    </p:cTn>
+                  </p:par>
+                  <p:par>
+                    <p:cTn id="11" fill="hold">
+                      <p:stCondLst>
+                        <p:cond delay="indefinite"/>
+                      </p:stCondLst>
+                      <p:childTnLst>
+                        <p:par>
+                          <p:cTn id="12" fill="hold">
+                            <p:stCondLst>
+                              <p:cond delay="0"/>
+                            </p:stCondLst>
+                            <p:childTnLst>
+                              <p:par>
+                                <p:cTn id="13" presetID="1" presetClass="entr" presetSubtype="0" fill="hold" nodeType="clickEffect">
+                                  <p:stCondLst>
+                                    <p:cond delay="0"/>
+                                  </p:stCondLst>
+                                  <p:childTnLst>
+                                    <p:set>
+                                      <p:cBhvr>
+                                        <p:cTn id="14" dur="1" fill="hold">
+                                          <p:stCondLst>
+                                            <p:cond delay="0"/>
+                                          </p:stCondLst>
+                                        </p:cTn>
+                                        <p:tgtEl>
+                                          <p:spTgt spid="3">
+                                            <p:txEl>
+                                              <p:pRg st="6" end="6"/>
+                                            </p:txEl>
+                                          </p:spTgt>
+                                        </p:tgtEl>
+                                        <p:attrNameLst>
+                                          <p:attrName>style.visibility</p:attrName>
+                                        </p:attrNameLst>
+                                      </p:cBhvr>
+                                      <p:to>
+                                        <p:strVal val="visible"/>
+                                      </p:to>
+                                    </p:set>
+                                  </p:childTnLst>
+                                </p:cTn>
+                              </p:par>
+                            </p:childTnLst>
+                          </p:cTn>
+                        </p:par>
+                      </p:childTnLst>
+                    </p:cTn>
+                  </p:par>
+                  <p:par>
+                    <p:cTn id="15" fill="hold">
+                      <p:stCondLst>
+                        <p:cond delay="indefinite"/>
+                      </p:stCondLst>
+                      <p:childTnLst>
+                        <p:par>
+                          <p:cTn id="16" fill="hold">
+                            <p:stCondLst>
+                              <p:cond delay="0"/>
+                            </p:stCondLst>
+                            <p:childTnLst>
+                              <p:par>
+                                <p:cTn id="17" presetID="1" presetClass="entr" presetSubtype="0" fill="hold" nodeType="clickEffect">
+                                  <p:stCondLst>
+                                    <p:cond delay="0"/>
+                                  </p:stCondLst>
+                                  <p:childTnLst>
+                                    <p:set>
+                                      <p:cBhvr>
+                                        <p:cTn id="18" dur="1" fill="hold">
+                                          <p:stCondLst>
+                                            <p:cond delay="0"/>
+                                          </p:stCondLst>
+                                        </p:cTn>
+                                        <p:tgtEl>
+                                          <p:spTgt spid="3">
+                                            <p:txEl>
+                                              <p:pRg st="7" end="7"/>
+                                            </p:txEl>
+                                          </p:spTgt>
+                                        </p:tgtEl>
+                                        <p:attrNameLst>
+                                          <p:attrName>style.visibility</p:attrName>
+                                        </p:attrNameLst>
+                                      </p:cBhvr>
+                                      <p:to>
+                                        <p:strVal val="visible"/>
+                                      </p:to>
+                                    </p:set>
+                                  </p:childTnLst>
+                                </p:cTn>
+                              </p:par>
+                            </p:childTnLst>
+                          </p:cTn>
+                        </p:par>
+                      </p:childTnLst>
+                    </p:cTn>
+                  </p:par>
+                </p:childTnLst>
+              </p:cTn>
+              <p:prevCondLst>
+                <p:cond evt="onPrev" delay="0">
+                  <p:tgtEl>
+                    <p:sldTgt/>
+                  </p:tgtEl>
+                </p:cond>
+              </p:prevCondLst>
+              <p:nextCondLst>
+                <p:cond evt="onNext" delay="0">
+                  <p:tgtEl>
+                    <p:sldTgt/>
+                  </p:tgtEl>
+                </p:cond>
+              </p:nextCondLst>
+            </p:seq>
+          </p:childTnLst>
+        </p:cTn>
+      </p:par>
+    </p:tnLst>
+  </p:timing>
+</p:sld>
+</file>
+
+<file path=ppt/slides/slide26.xml><?xml version="1.0" encoding="utf-8"?>
+<p:sld xmlns:a="http://schemas.openxmlformats.org/drawingml/2006/main" xmlns:r="http://schemas.openxmlformats.org/officeDocument/2006/relationships" xmlns:p="http://schemas.openxmlformats.org/presentationml/2006/main">
+  <p:cSld>
+    <p:spTree>
+      <p:nvGrpSpPr>
+        <p:cNvPr id="1" name=""/>
+        <p:cNvGrpSpPr/>
+        <p:nvPr/>
+      </p:nvGrpSpPr>
+      <p:grpSpPr>
+        <a:xfrm>
+          <a:off x="0" y="0"/>
+          <a:ext cx="0" cy="0"/>
+          <a:chOff x="0" y="0"/>
+          <a:chExt cx="0" cy="0"/>
+        </a:xfrm>
+      </p:grpSpPr>
+      <p:sp>
+        <p:nvSpPr>
+          <p:cNvPr id="2" name="Title 1"/>
+          <p:cNvSpPr>
+            <a:spLocks noGrp="1"/>
+          </p:cNvSpPr>
+          <p:nvPr>
+            <p:ph type="title"/>
+          </p:nvPr>
+        </p:nvSpPr>
+        <p:spPr/>
+        <p:txBody>
+          <a:bodyPr>
+            <a:normAutofit/>
+          </a:bodyPr>
+          <a:lstStyle/>
+          <a:p>
+            <a:r>
+              <a:rPr lang="en-US" dirty="0" smtClean="0"/>
+              <a:t>MPI will do map/reduce for us</a:t>
+            </a:r>
+            <a:endParaRPr lang="en-US" dirty="0"/>
+          </a:p>
+        </p:txBody>
+      </p:sp>
+      <p:sp>
+        <p:nvSpPr>
+          <p:cNvPr id="3" name="Content Placeholder 2"/>
+          <p:cNvSpPr>
+            <a:spLocks noGrp="1"/>
+          </p:cNvSpPr>
+          <p:nvPr>
+            <p:ph idx="1"/>
+          </p:nvPr>
+        </p:nvSpPr>
+        <p:spPr/>
+        <p:txBody>
+          <a:bodyPr/>
+          <a:lstStyle/>
+          <a:p>
+            <a:r>
+              <a:rPr lang="en-US" dirty="0" smtClean="0"/>
+              <a:t>MPI has a built-in concept like map/reduce.</a:t>
+            </a:r>
+          </a:p>
+          <a:p>
+            <a:pPr marL="800100" lvl="1" indent="-342900"/>
+            <a:r>
+              <a:rPr lang="en-US" dirty="0" smtClean="0"/>
+              <a:t>Uses advanced sending algorithms based on network topology.</a:t>
+            </a:r>
+          </a:p>
+          <a:p>
+            <a:pPr marL="800100" lvl="1" indent="-342900"/>
+            <a:r>
+              <a:rPr lang="en-US" dirty="0" smtClean="0"/>
+              <a:t>Does for </a:t>
+            </a:r>
+            <a:r>
+              <a:rPr lang="en-US" i="1" dirty="0" smtClean="0"/>
+              <a:t>n</a:t>
+            </a:r>
+            <a:r>
+              <a:rPr lang="en-US" dirty="0" smtClean="0"/>
+              <a:t> nodes, does not block </a:t>
+            </a:r>
+            <a:r>
+              <a:rPr lang="en-US" i="1" dirty="0" smtClean="0"/>
+              <a:t>n</a:t>
+            </a:r>
+            <a:r>
+              <a:rPr lang="en-US" dirty="0" smtClean="0"/>
+              <a:t> times waiting for network.</a:t>
+            </a:r>
+          </a:p>
+          <a:p>
+            <a:pPr marL="800100" lvl="1" indent="-342900"/>
+            <a:r>
+              <a:rPr lang="en-US" dirty="0" smtClean="0"/>
+              <a:t>Simplifies the client code.</a:t>
+            </a:r>
+          </a:p>
+          <a:p>
+            <a:pPr marL="342900" indent="-342900"/>
+            <a:endParaRPr lang="en-US" dirty="0"/>
+          </a:p>
+          <a:p>
+            <a:pPr marL="342900" indent="-342900"/>
+            <a:r>
+              <a:rPr lang="en-US" dirty="0" smtClean="0"/>
+              <a:t>MPI calls this scatter/gather.</a:t>
+            </a:r>
+          </a:p>
+          <a:p>
+            <a:pPr marL="800100" lvl="1" indent="-342900"/>
+            <a:r>
+              <a:rPr lang="en-US" dirty="0" smtClean="0">
+                <a:hlinkClick r:id="rId2"/>
+              </a:rPr>
+              <a:t>MPI_Scatter</a:t>
+            </a:r>
+            <a:r>
+              <a:rPr lang="en-US" dirty="0" smtClean="0"/>
+              <a:t> (similar to map)</a:t>
+            </a:r>
+          </a:p>
+          <a:p>
+            <a:pPr marL="800100" lvl="1" indent="-342900"/>
+            <a:r>
+              <a:rPr lang="en-US" dirty="0" smtClean="0">
+                <a:hlinkClick r:id="rId3"/>
+              </a:rPr>
+              <a:t>MPI_Gather</a:t>
+            </a:r>
+            <a:r>
+              <a:rPr lang="en-US" dirty="0" smtClean="0"/>
+              <a:t> (similar to reduce)</a:t>
+            </a:r>
+          </a:p>
+          <a:p>
+            <a:r>
+              <a:rPr lang="en-US" dirty="0" smtClean="0"/>
+              <a:t>Let’s see them in action.</a:t>
+            </a:r>
+            <a:endParaRPr lang="en-US" dirty="0"/>
+          </a:p>
+        </p:txBody>
+      </p:sp>
+      <p:sp>
+        <p:nvSpPr>
+          <p:cNvPr id="4" name="Slide Number Placeholder 3"/>
+          <p:cNvSpPr>
+            <a:spLocks noGrp="1"/>
+          </p:cNvSpPr>
+          <p:nvPr>
+            <p:ph type="sldNum" sz="quarter" idx="12"/>
+          </p:nvPr>
+        </p:nvSpPr>
+        <p:spPr/>
+        <p:txBody>
+          <a:bodyPr/>
+          <a:lstStyle/>
+          <a:p>
+            <a:fld id="{6DA12B36-9664-4CB0-8B2E-F4A2F44AE97E}" type="slidenum">
+              <a:rPr lang="en-US" smtClean="0"/>
+              <a:t>26</a:t>
+            </a:fld>
+            <a:endParaRPr lang="en-US"/>
+          </a:p>
+        </p:txBody>
+      </p:sp>
+    </p:spTree>
+    <p:extLst>
+      <p:ext uri="{BB962C8B-B14F-4D97-AF65-F5344CB8AC3E}">
+        <p14:creationId xmlns:p14="http://schemas.microsoft.com/office/powerpoint/2010/main" val="1691603660"/>
       </p:ext>
     </p:extLst>
   </p:cSld>

</xml_diff>